<commit_message>
added into and defined data set
</commit_message>
<xml_diff>
--- a/Final4441_presentation.pptx
+++ b/Final4441_presentation.pptx
@@ -275,7 +275,7 @@
           <a:p>
             <a:fld id="{3C31A08B-2C92-2949-9A49-318791DCE70A}" type="datetimeFigureOut">
               <a:rPr lang="en-US" smtClean="0"/>
-              <a:t>8/10/21</a:t>
+              <a:t>8/11/21</a:t>
             </a:fld>
             <a:endParaRPr lang="en-US"/>
           </a:p>
@@ -473,7 +473,7 @@
           <a:p>
             <a:fld id="{3C31A08B-2C92-2949-9A49-318791DCE70A}" type="datetimeFigureOut">
               <a:rPr lang="en-US" smtClean="0"/>
-              <a:t>8/10/21</a:t>
+              <a:t>8/11/21</a:t>
             </a:fld>
             <a:endParaRPr lang="en-US"/>
           </a:p>
@@ -681,7 +681,7 @@
           <a:p>
             <a:fld id="{3C31A08B-2C92-2949-9A49-318791DCE70A}" type="datetimeFigureOut">
               <a:rPr lang="en-US" smtClean="0"/>
-              <a:t>8/10/21</a:t>
+              <a:t>8/11/21</a:t>
             </a:fld>
             <a:endParaRPr lang="en-US"/>
           </a:p>
@@ -879,7 +879,7 @@
           <a:p>
             <a:fld id="{3C31A08B-2C92-2949-9A49-318791DCE70A}" type="datetimeFigureOut">
               <a:rPr lang="en-US" smtClean="0"/>
-              <a:t>8/10/21</a:t>
+              <a:t>8/11/21</a:t>
             </a:fld>
             <a:endParaRPr lang="en-US"/>
           </a:p>
@@ -1154,7 +1154,7 @@
           <a:p>
             <a:fld id="{3C31A08B-2C92-2949-9A49-318791DCE70A}" type="datetimeFigureOut">
               <a:rPr lang="en-US" smtClean="0"/>
-              <a:t>8/10/21</a:t>
+              <a:t>8/11/21</a:t>
             </a:fld>
             <a:endParaRPr lang="en-US"/>
           </a:p>
@@ -1419,7 +1419,7 @@
           <a:p>
             <a:fld id="{3C31A08B-2C92-2949-9A49-318791DCE70A}" type="datetimeFigureOut">
               <a:rPr lang="en-US" smtClean="0"/>
-              <a:t>8/10/21</a:t>
+              <a:t>8/11/21</a:t>
             </a:fld>
             <a:endParaRPr lang="en-US"/>
           </a:p>
@@ -1831,7 +1831,7 @@
           <a:p>
             <a:fld id="{3C31A08B-2C92-2949-9A49-318791DCE70A}" type="datetimeFigureOut">
               <a:rPr lang="en-US" smtClean="0"/>
-              <a:t>8/10/21</a:t>
+              <a:t>8/11/21</a:t>
             </a:fld>
             <a:endParaRPr lang="en-US"/>
           </a:p>
@@ -1972,7 +1972,7 @@
           <a:p>
             <a:fld id="{3C31A08B-2C92-2949-9A49-318791DCE70A}" type="datetimeFigureOut">
               <a:rPr lang="en-US" smtClean="0"/>
-              <a:t>8/10/21</a:t>
+              <a:t>8/11/21</a:t>
             </a:fld>
             <a:endParaRPr lang="en-US"/>
           </a:p>
@@ -2085,7 +2085,7 @@
           <a:p>
             <a:fld id="{3C31A08B-2C92-2949-9A49-318791DCE70A}" type="datetimeFigureOut">
               <a:rPr lang="en-US" smtClean="0"/>
-              <a:t>8/10/21</a:t>
+              <a:t>8/11/21</a:t>
             </a:fld>
             <a:endParaRPr lang="en-US"/>
           </a:p>
@@ -2396,7 +2396,7 @@
           <a:p>
             <a:fld id="{3C31A08B-2C92-2949-9A49-318791DCE70A}" type="datetimeFigureOut">
               <a:rPr lang="en-US" smtClean="0"/>
-              <a:t>8/10/21</a:t>
+              <a:t>8/11/21</a:t>
             </a:fld>
             <a:endParaRPr lang="en-US"/>
           </a:p>
@@ -2684,7 +2684,7 @@
           <a:p>
             <a:fld id="{3C31A08B-2C92-2949-9A49-318791DCE70A}" type="datetimeFigureOut">
               <a:rPr lang="en-US" smtClean="0"/>
-              <a:t>8/10/21</a:t>
+              <a:t>8/11/21</a:t>
             </a:fld>
             <a:endParaRPr lang="en-US"/>
           </a:p>
@@ -2925,7 +2925,7 @@
           <a:p>
             <a:fld id="{3C31A08B-2C92-2949-9A49-318791DCE70A}" type="datetimeFigureOut">
               <a:rPr lang="en-US" smtClean="0"/>
-              <a:t>8/10/21</a:t>
+              <a:t>8/11/21</a:t>
             </a:fld>
             <a:endParaRPr lang="en-US"/>
           </a:p>
@@ -31409,7 +31409,7 @@
                   <a:schemeClr val="bg1"/>
                 </a:solidFill>
               </a:rPr>
-              <a:t>Assess the significance various factors such as age, race, mental illness and gender have on the population of people in the United States who have been fatally shot by the police. </a:t>
+              <a:t>Assess the significance various factors such as age, race, mental illness and gender have on the population of civilians in the United States who have been fatally shot by the police. </a:t>
             </a:r>
           </a:p>
         </p:txBody>
@@ -31930,7 +31930,12 @@
             <p:ph type="title"/>
           </p:nvPr>
         </p:nvSpPr>
-        <p:spPr/>
+        <p:spPr>
+          <a:xfrm>
+            <a:off x="388307" y="227338"/>
+            <a:ext cx="10515600" cy="1325563"/>
+          </a:xfrm>
+        </p:spPr>
         <p:txBody>
           <a:bodyPr/>
           <a:lstStyle/>
@@ -31958,20 +31963,90 @@
             <p:ph idx="1"/>
           </p:nvPr>
         </p:nvSpPr>
-        <p:spPr/>
+        <p:spPr>
+          <a:xfrm>
+            <a:off x="388307" y="1390389"/>
+            <a:ext cx="10965493" cy="4786574"/>
+          </a:xfrm>
+        </p:spPr>
         <p:txBody>
-          <a:bodyPr/>
+          <a:bodyPr>
+            <a:normAutofit fontScale="92500" lnSpcReduction="10000"/>
+          </a:bodyPr>
           <a:lstStyle/>
           <a:p>
             <a:r>
               <a:rPr lang="en-US" dirty="0"/>
-              <a:t>Fatal police shootings in the US from 2015-2021</a:t>
+              <a:t>Every fatal police shootings in the US from 2015-2021</a:t>
+            </a:r>
+          </a:p>
+          <a:p>
+            <a:pPr lvl="1"/>
+            <a:r>
+              <a:rPr lang="en-US" dirty="0"/>
+              <a:t>Definition of fatal shooting: A police officer in the line of duty who shoots and kills a civilian</a:t>
+            </a:r>
+          </a:p>
+          <a:p>
+            <a:pPr lvl="1"/>
+            <a:r>
+              <a:rPr lang="en-US" dirty="0"/>
+              <a:t>Not included: </a:t>
+            </a:r>
+          </a:p>
+          <a:p>
+            <a:pPr lvl="2"/>
+            <a:r>
+              <a:rPr lang="en-US" dirty="0"/>
+              <a:t>deaths of people in police custody</a:t>
+            </a:r>
+          </a:p>
+          <a:p>
+            <a:pPr lvl="2"/>
+            <a:r>
+              <a:rPr lang="en-US" dirty="0"/>
+              <a:t>fatal shootings by off-duty officers</a:t>
+            </a:r>
+          </a:p>
+          <a:p>
+            <a:pPr lvl="2"/>
+            <a:r>
+              <a:rPr lang="en-US" dirty="0"/>
+              <a:t>non-shooting deaths</a:t>
             </a:r>
           </a:p>
           <a:p>
             <a:r>
               <a:rPr lang="en-US" dirty="0"/>
-              <a:t>Collected by the Washington Post</a:t>
+              <a:t>Collected by the Washington Post via:</a:t>
+            </a:r>
+          </a:p>
+          <a:p>
+            <a:pPr lvl="1"/>
+            <a:r>
+              <a:rPr lang="en-US" dirty="0"/>
+              <a:t>local news reports</a:t>
+            </a:r>
+          </a:p>
+          <a:p>
+            <a:pPr lvl="1"/>
+            <a:r>
+              <a:rPr lang="en-US" dirty="0"/>
+              <a:t>law enforcement websites</a:t>
+            </a:r>
+          </a:p>
+          <a:p>
+            <a:pPr lvl="1"/>
+            <a:r>
+              <a:rPr lang="en-US" dirty="0"/>
+              <a:t>social media</a:t>
+            </a:r>
+          </a:p>
+          <a:p>
+            <a:pPr lvl="1"/>
+            <a:r>
+              <a:rPr lang="en-US" dirty="0"/>
+              <a:t>independent databases such as Killed by Police and Fatal Encounters</a:t>
             </a:r>
           </a:p>
           <a:p>

</xml_diff>